<commit_message>
Added Research Project Presentation
</commit_message>
<xml_diff>
--- a/translations/en-us/fll/Sharing.pptx
+++ b/translations/en-us/fll/Sharing.pptx
@@ -5,13 +5,17 @@
     <p:sldMasterId id="2147483779" r:id="rId1"/>
   </p:sldMasterIdLst>
   <p:notesMasterIdLst>
-    <p:notesMasterId r:id="rId6"/>
+    <p:notesMasterId r:id="rId10"/>
   </p:notesMasterIdLst>
   <p:sldIdLst>
-    <p:sldId id="256" r:id="rId2"/>
-    <p:sldId id="257" r:id="rId3"/>
-    <p:sldId id="258" r:id="rId4"/>
-    <p:sldId id="259" r:id="rId5"/>
+    <p:sldId id="268" r:id="rId2"/>
+    <p:sldId id="269" r:id="rId3"/>
+    <p:sldId id="257" r:id="rId4"/>
+    <p:sldId id="264" r:id="rId5"/>
+    <p:sldId id="265" r:id="rId6"/>
+    <p:sldId id="267" r:id="rId7"/>
+    <p:sldId id="266" r:id="rId8"/>
+    <p:sldId id="258" r:id="rId9"/>
   </p:sldIdLst>
   <p:sldSz cx="9144000" cy="6858000" type="screen4x3"/>
   <p:notesSz cx="6858000" cy="9144000"/>
@@ -200,7 +204,7 @@
           <a:p>
             <a:fld id="{A78B980B-A051-5042-A199-B77431CF73D3}" type="datetimeFigureOut">
               <a:rPr lang="en-US" smtClean="0"/>
-              <a:t>8/26/17</a:t>
+              <a:t>10/31/17</a:t>
             </a:fld>
             <a:endParaRPr lang="en-US"/>
           </a:p>
@@ -542,7 +546,91 @@
     </p:spTree>
     <p:extLst>
       <p:ext uri="{BB962C8B-B14F-4D97-AF65-F5344CB8AC3E}">
-        <p14:creationId xmlns:p14="http://schemas.microsoft.com/office/powerpoint/2010/main" val="1659114348"/>
+        <p14:creationId xmlns:p14="http://schemas.microsoft.com/office/powerpoint/2010/main" val="258128699"/>
+      </p:ext>
+    </p:extLst>
+  </p:cSld>
+  <p:clrMapOvr>
+    <a:masterClrMapping/>
+  </p:clrMapOvr>
+</p:notes>
+</file>
+
+<file path=ppt/notesSlides/notesSlide2.xml><?xml version="1.0" encoding="utf-8"?>
+<p:notes xmlns:a="http://schemas.openxmlformats.org/drawingml/2006/main" xmlns:r="http://schemas.openxmlformats.org/officeDocument/2006/relationships" xmlns:p="http://schemas.openxmlformats.org/presentationml/2006/main">
+  <p:cSld>
+    <p:spTree>
+      <p:nvGrpSpPr>
+        <p:cNvPr id="1" name=""/>
+        <p:cNvGrpSpPr/>
+        <p:nvPr/>
+      </p:nvGrpSpPr>
+      <p:grpSpPr>
+        <a:xfrm>
+          <a:off x="0" y="0"/>
+          <a:ext cx="0" cy="0"/>
+          <a:chOff x="0" y="0"/>
+          <a:chExt cx="0" cy="0"/>
+        </a:xfrm>
+      </p:grpSpPr>
+      <p:sp>
+        <p:nvSpPr>
+          <p:cNvPr id="2" name="Slide Image Placeholder 1"/>
+          <p:cNvSpPr>
+            <a:spLocks noGrp="1" noRot="1" noChangeAspect="1"/>
+          </p:cNvSpPr>
+          <p:nvPr>
+            <p:ph type="sldImg"/>
+          </p:nvPr>
+        </p:nvSpPr>
+        <p:spPr/>
+      </p:sp>
+      <p:sp>
+        <p:nvSpPr>
+          <p:cNvPr id="3" name="Notes Placeholder 2"/>
+          <p:cNvSpPr>
+            <a:spLocks noGrp="1"/>
+          </p:cNvSpPr>
+          <p:nvPr>
+            <p:ph type="body" idx="1"/>
+          </p:nvPr>
+        </p:nvSpPr>
+        <p:spPr/>
+        <p:txBody>
+          <a:bodyPr/>
+          <a:lstStyle/>
+          <a:p>
+            <a:endParaRPr lang="en-US"/>
+          </a:p>
+        </p:txBody>
+      </p:sp>
+      <p:sp>
+        <p:nvSpPr>
+          <p:cNvPr id="4" name="Slide Number Placeholder 3"/>
+          <p:cNvSpPr>
+            <a:spLocks noGrp="1"/>
+          </p:cNvSpPr>
+          <p:nvPr>
+            <p:ph type="sldNum" sz="quarter" idx="10"/>
+          </p:nvPr>
+        </p:nvSpPr>
+        <p:spPr/>
+        <p:txBody>
+          <a:bodyPr/>
+          <a:lstStyle/>
+          <a:p>
+            <a:fld id="{A13AEE19-6760-F547-8467-920A15216243}" type="slidenum">
+              <a:rPr lang="en-US" smtClean="0"/>
+              <a:t>7</a:t>
+            </a:fld>
+            <a:endParaRPr lang="en-US"/>
+          </a:p>
+        </p:txBody>
+      </p:sp>
+    </p:spTree>
+    <p:extLst>
+      <p:ext uri="{BB962C8B-B14F-4D97-AF65-F5344CB8AC3E}">
+        <p14:creationId xmlns:p14="http://schemas.microsoft.com/office/powerpoint/2010/main" val="1027537370"/>
       </p:ext>
     </p:extLst>
   </p:cSld>
@@ -772,9 +860,9 @@
           <a:bodyPr/>
           <a:lstStyle/>
           <a:p>
-            <a:fld id="{5996CF52-0925-2547-8DD1-56062ED378CC}" type="datetime1">
-              <a:rPr lang="en-US" smtClean="0"/>
-              <a:t>8/26/17</a:t>
+            <a:fld id="{6B0D663D-A85C-FD42-9C3A-D6E6F8E311E6}" type="datetime1">
+              <a:rPr lang="en-US" smtClean="0"/>
+              <a:t>10/31/17</a:t>
             </a:fld>
             <a:endParaRPr lang="en-US" dirty="0"/>
           </a:p>
@@ -797,7 +885,7 @@
           <a:p>
             <a:r>
               <a:rPr lang="en-US" smtClean="0"/>
-              <a:t>Copyright 2017, EV3Lessons.com (Last Edit 8/18/2017)</a:t>
+              <a:t>Copyright 2017, EV3Lessons.com (Last Edit 10/31/2017)</a:t>
             </a:r>
             <a:endParaRPr lang="en-US" dirty="0"/>
           </a:p>
@@ -921,7 +1009,7 @@
           <a:blip r:embed="rId2">
             <a:extLst>
               <a:ext uri="{28A0092B-C50C-407E-A947-70E740481C1C}">
-                <a14:useLocalDpi xmlns:a14="http://schemas.microsoft.com/office/drawing/2010/main" val="0"/>
+                <a14:useLocalDpi xmlns:a14="http://schemas.microsoft.com/office/drawing/2010/main"/>
               </a:ext>
             </a:extLst>
           </a:blip>
@@ -1327,9 +1415,9 @@
           <a:bodyPr/>
           <a:lstStyle/>
           <a:p>
-            <a:fld id="{550FBCBB-5BD5-6147-8DD8-37FC601A81B4}" type="datetime1">
-              <a:rPr lang="en-US" smtClean="0"/>
-              <a:t>8/26/17</a:t>
+            <a:fld id="{427C017B-E2FC-9841-A6CB-6BCB0A2D76BD}" type="datetime1">
+              <a:rPr lang="en-US" smtClean="0"/>
+              <a:t>10/31/17</a:t>
             </a:fld>
             <a:endParaRPr lang="en-US" dirty="0"/>
           </a:p>
@@ -1352,7 +1440,7 @@
           <a:p>
             <a:r>
               <a:rPr lang="en-US" smtClean="0"/>
-              <a:t>Copyright 2017, EV3Lessons.com (Last Edit 8/18/2017)</a:t>
+              <a:t>Copyright 2017, EV3Lessons.com (Last Edit 10/31/2017)</a:t>
             </a:r>
             <a:endParaRPr lang="en-US" dirty="0"/>
           </a:p>
@@ -1582,9 +1670,9 @@
           <a:bodyPr/>
           <a:lstStyle/>
           <a:p>
-            <a:fld id="{80133D87-13ED-BA40-9CD5-F9989081E091}" type="datetime1">
-              <a:rPr lang="en-US" smtClean="0"/>
-              <a:t>8/26/17</a:t>
+            <a:fld id="{2EFDAE88-C28C-9545-990E-AD2B2F24F1AD}" type="datetime1">
+              <a:rPr lang="en-US" smtClean="0"/>
+              <a:t>10/31/17</a:t>
             </a:fld>
             <a:endParaRPr lang="en-US" dirty="0"/>
           </a:p>
@@ -1607,7 +1695,7 @@
           <a:p>
             <a:r>
               <a:rPr lang="en-US" smtClean="0"/>
-              <a:t>Copyright 2017, EV3Lessons.com (Last Edit 8/18/2017)</a:t>
+              <a:t>Copyright 2017, EV3Lessons.com (Last Edit 10/31/2017)</a:t>
             </a:r>
             <a:endParaRPr lang="en-US" dirty="0"/>
           </a:p>
@@ -1751,9 +1839,9 @@
           <a:bodyPr/>
           <a:lstStyle/>
           <a:p>
-            <a:fld id="{A892D5AC-688C-954B-B5EC-73EEE42FB103}" type="datetime1">
-              <a:rPr lang="en-US" smtClean="0"/>
-              <a:t>8/26/17</a:t>
+            <a:fld id="{B6990274-294F-E24B-BE15-B6214C644CFE}" type="datetime1">
+              <a:rPr lang="en-US" smtClean="0"/>
+              <a:t>10/31/17</a:t>
             </a:fld>
             <a:endParaRPr lang="en-US" dirty="0"/>
           </a:p>
@@ -1776,7 +1864,7 @@
           <a:p>
             <a:r>
               <a:rPr lang="en-US" smtClean="0"/>
-              <a:t>Copyright 2017, EV3Lessons.com (Last Edit 8/18/2017)</a:t>
+              <a:t>Copyright 2017, EV3Lessons.com (Last Edit 10/31/2017)</a:t>
             </a:r>
             <a:endParaRPr lang="en-US" dirty="0"/>
           </a:p>
@@ -2093,9 +2181,9 @@
           <a:bodyPr/>
           <a:lstStyle/>
           <a:p>
-            <a:fld id="{B3DEF537-2B83-E04E-AF06-D2C31CAF4630}" type="datetime1">
-              <a:rPr lang="en-US" smtClean="0"/>
-              <a:t>8/26/17</a:t>
+            <a:fld id="{AAF0B4D7-F2BE-AD45-AA4E-FC0F92BD8A7F}" type="datetime1">
+              <a:rPr lang="en-US" smtClean="0"/>
+              <a:t>10/31/17</a:t>
             </a:fld>
             <a:endParaRPr lang="en-US" dirty="0"/>
           </a:p>
@@ -2118,7 +2206,7 @@
           <a:p>
             <a:r>
               <a:rPr lang="en-US" smtClean="0"/>
-              <a:t>Copyright 2017, EV3Lessons.com (Last Edit 8/18/2017)</a:t>
+              <a:t>Copyright 2017, EV3Lessons.com (Last Edit 10/31/2017)</a:t>
             </a:r>
             <a:endParaRPr lang="en-US" dirty="0"/>
           </a:p>
@@ -2412,9 +2500,9 @@
           <a:bodyPr/>
           <a:lstStyle/>
           <a:p>
-            <a:fld id="{44B46A73-74E9-5F41-A0C6-B5BD56A03507}" type="datetime1">
-              <a:rPr lang="en-US" smtClean="0"/>
-              <a:t>8/26/17</a:t>
+            <a:fld id="{03ABAD35-7A34-854F-A962-773FE80F2E55}" type="datetime1">
+              <a:rPr lang="en-US" smtClean="0"/>
+              <a:t>10/31/17</a:t>
             </a:fld>
             <a:endParaRPr lang="en-US" dirty="0"/>
           </a:p>
@@ -2437,7 +2525,7 @@
           <a:p>
             <a:r>
               <a:rPr lang="en-US" smtClean="0"/>
-              <a:t>Copyright 2017, EV3Lessons.com (Last Edit 8/18/2017)</a:t>
+              <a:t>Copyright 2017, EV3Lessons.com (Last Edit 10/31/2017)</a:t>
             </a:r>
             <a:endParaRPr lang="en-US" dirty="0"/>
           </a:p>
@@ -2790,9 +2878,9 @@
           <a:bodyPr/>
           <a:lstStyle/>
           <a:p>
-            <a:fld id="{9F449150-E4DA-974B-868F-BECC03669E6B}" type="datetime1">
-              <a:rPr lang="en-US" smtClean="0"/>
-              <a:t>8/26/17</a:t>
+            <a:fld id="{6EAA17EA-26C9-664D-BCD5-56E85BAA17AA}" type="datetime1">
+              <a:rPr lang="en-US" smtClean="0"/>
+              <a:t>10/31/17</a:t>
             </a:fld>
             <a:endParaRPr lang="en-US" dirty="0"/>
           </a:p>
@@ -2815,7 +2903,7 @@
           <a:p>
             <a:r>
               <a:rPr lang="en-US" smtClean="0"/>
-              <a:t>Copyright 2017, EV3Lessons.com (Last Edit 8/18/2017)</a:t>
+              <a:t>Copyright 2017, EV3Lessons.com (Last Edit 10/31/2017)</a:t>
             </a:r>
             <a:endParaRPr lang="en-US" dirty="0"/>
           </a:p>
@@ -2907,9 +2995,9 @@
           <a:bodyPr/>
           <a:lstStyle/>
           <a:p>
-            <a:fld id="{8B1B36C1-5310-E048-9F71-4AD35E4ECB0E}" type="datetime1">
-              <a:rPr lang="en-US" smtClean="0"/>
-              <a:t>8/26/17</a:t>
+            <a:fld id="{AC7554CF-AAE4-5A4D-A918-940091819543}" type="datetime1">
+              <a:rPr lang="en-US" smtClean="0"/>
+              <a:t>10/31/17</a:t>
             </a:fld>
             <a:endParaRPr lang="en-US" dirty="0"/>
           </a:p>
@@ -2932,7 +3020,7 @@
           <a:p>
             <a:r>
               <a:rPr lang="en-US" smtClean="0"/>
-              <a:t>Copyright 2017, EV3Lessons.com (Last Edit 8/18/2017)</a:t>
+              <a:t>Copyright 2017, EV3Lessons.com (Last Edit 10/31/2017)</a:t>
             </a:r>
             <a:endParaRPr lang="en-US" dirty="0"/>
           </a:p>
@@ -3077,9 +3165,9 @@
           <a:bodyPr/>
           <a:lstStyle/>
           <a:p>
-            <a:fld id="{8919E129-F47D-AB47-B2E5-49EDD32BA4D8}" type="datetime1">
-              <a:rPr lang="en-US" smtClean="0"/>
-              <a:t>8/26/17</a:t>
+            <a:fld id="{1B73608C-4145-3841-8C1B-61E10F8A0F0A}" type="datetime1">
+              <a:rPr lang="en-US" smtClean="0"/>
+              <a:t>10/31/17</a:t>
             </a:fld>
             <a:endParaRPr lang="en-US" dirty="0"/>
           </a:p>
@@ -3110,7 +3198,7 @@
           <a:p>
             <a:r>
               <a:rPr lang="en-US" smtClean="0"/>
-              <a:t>Copyright 2017, EV3Lessons.com (Last Edit 8/18/2017)</a:t>
+              <a:t>Copyright 2017, EV3Lessons.com (Last Edit 10/31/2017)</a:t>
             </a:r>
             <a:endParaRPr lang="en-US" dirty="0"/>
           </a:p>
@@ -3430,9 +3518,9 @@
             </a:lvl1pPr>
           </a:lstStyle>
           <a:p>
-            <a:fld id="{14E0D22B-CB3C-484F-9BD2-5A3DD0134A39}" type="datetime1">
-              <a:rPr lang="en-US" smtClean="0"/>
-              <a:t>8/26/17</a:t>
+            <a:fld id="{2D1542B3-62AE-5A41-BC4C-219EAAA2A752}" type="datetime1">
+              <a:rPr lang="en-US" smtClean="0"/>
+              <a:t>10/31/17</a:t>
             </a:fld>
             <a:endParaRPr lang="en-US" dirty="0"/>
           </a:p>
@@ -3468,7 +3556,7 @@
           <a:p>
             <a:r>
               <a:rPr lang="en-US" smtClean="0"/>
-              <a:t>Copyright 2017, EV3Lessons.com (Last Edit 8/18/2017)</a:t>
+              <a:t>Copyright 2017, EV3Lessons.com (Last Edit 10/31/2017)</a:t>
             </a:r>
             <a:endParaRPr lang="en-US" dirty="0"/>
           </a:p>
@@ -3808,9 +3896,9 @@
           <a:bodyPr/>
           <a:lstStyle/>
           <a:p>
-            <a:fld id="{57479328-D90E-D348-BAF2-E30E4AEA0469}" type="datetime1">
-              <a:rPr lang="en-US" smtClean="0"/>
-              <a:t>8/26/17</a:t>
+            <a:fld id="{466323DB-642B-984E-B5FB-3F738A75208B}" type="datetime1">
+              <a:rPr lang="en-US" smtClean="0"/>
+              <a:t>10/31/17</a:t>
             </a:fld>
             <a:endParaRPr lang="en-US" dirty="0"/>
           </a:p>
@@ -3833,7 +3921,7 @@
           <a:p>
             <a:r>
               <a:rPr lang="en-US" smtClean="0"/>
-              <a:t>Copyright 2017, EV3Lessons.com (Last Edit 8/18/2017)</a:t>
+              <a:t>Copyright 2017, EV3Lessons.com (Last Edit 10/31/2017)</a:t>
             </a:r>
             <a:endParaRPr lang="en-US" dirty="0"/>
           </a:p>
@@ -4094,9 +4182,9 @@
             </a:lvl1pPr>
           </a:lstStyle>
           <a:p>
-            <a:fld id="{B4335AD2-DA9E-B347-B26E-4A9D4805EE7F}" type="datetime1">
-              <a:rPr lang="en-US" smtClean="0"/>
-              <a:t>8/26/17</a:t>
+            <a:fld id="{74501402-24DC-A843-9E8B-48F2D80A77FD}" type="datetime1">
+              <a:rPr lang="en-US" smtClean="0"/>
+              <a:t>10/31/17</a:t>
             </a:fld>
             <a:endParaRPr lang="en-US" dirty="0"/>
           </a:p>
@@ -4135,7 +4223,7 @@
           <a:p>
             <a:r>
               <a:rPr lang="en-US" smtClean="0"/>
-              <a:t>Copyright 2017, EV3Lessons.com (Last Edit 8/18/2017)</a:t>
+              <a:t>Copyright 2017, EV3Lessons.com (Last Edit 10/31/2017)</a:t>
             </a:r>
             <a:endParaRPr lang="en-US" dirty="0"/>
           </a:p>
@@ -4683,14 +4771,15 @@
         </p:nvSpPr>
         <p:spPr/>
         <p:txBody>
-          <a:bodyPr/>
-          <a:lstStyle/>
-          <a:p>
-            <a:r>
-              <a:rPr lang="en-US" dirty="0" smtClean="0"/>
-              <a:t>Sharing</a:t>
-            </a:r>
-            <a:endParaRPr lang="en-US" dirty="0"/>
+          <a:bodyPr>
+            <a:normAutofit/>
+          </a:bodyPr>
+          <a:lstStyle/>
+          <a:p>
+            <a:r>
+              <a:rPr lang="en-US" dirty="0"/>
+              <a:t>Sharing Your Project</a:t>
+            </a:r>
           </a:p>
         </p:txBody>
       </p:sp>
@@ -4706,14 +4795,36 @@
         </p:nvSpPr>
         <p:spPr/>
         <p:txBody>
-          <a:bodyPr/>
-          <a:lstStyle/>
-          <a:p>
-            <a:r>
-              <a:rPr lang="en-US" dirty="0" smtClean="0"/>
-              <a:t>By Not the Droids YOU ARE LOOKING FOR</a:t>
-            </a:r>
-            <a:endParaRPr lang="en-US" dirty="0"/>
+          <a:bodyPr>
+            <a:noAutofit/>
+          </a:bodyPr>
+          <a:lstStyle/>
+          <a:p>
+            <a:r>
+              <a:rPr lang="en-US" sz="3200" dirty="0"/>
+              <a:t>By Team 3659 </a:t>
+            </a:r>
+            <a:r>
+              <a:rPr lang="en-US" sz="3200" dirty="0" err="1"/>
+              <a:t>N</a:t>
+            </a:r>
+            <a:r>
+              <a:rPr lang="en-US" sz="3200" cap="none" dirty="0" err="1"/>
+              <a:t>e</a:t>
+            </a:r>
+            <a:r>
+              <a:rPr lang="en-US" sz="3200" dirty="0" err="1"/>
+              <a:t>Xt</a:t>
+            </a:r>
+            <a:r>
+              <a:rPr lang="en-US" sz="3200" dirty="0"/>
+              <a:t> </a:t>
+            </a:r>
+            <a:r>
+              <a:rPr lang="en-US" sz="3200" dirty="0" smtClean="0"/>
+              <a:t>Gen &amp; NOT THE DROIDS YOU ARE LOOKING FOR</a:t>
+            </a:r>
+            <a:endParaRPr lang="en-US" sz="3200" dirty="0"/>
           </a:p>
         </p:txBody>
       </p:sp>
@@ -4734,7 +4845,7 @@
           <a:p>
             <a:r>
               <a:rPr lang="en-US" smtClean="0"/>
-              <a:t>Copyright 2017, EV3Lessons.com (Last Edit 8/18/2017)</a:t>
+              <a:t>Copyright 2017, EV3Lessons.com (Last Edit 10/31/2017)</a:t>
             </a:r>
             <a:endParaRPr lang="en-US" dirty="0"/>
           </a:p>
@@ -4763,10 +4874,40 @@
           </a:p>
         </p:txBody>
       </p:sp>
+      <p:pic>
+        <p:nvPicPr>
+          <p:cNvPr id="6" name="Picture 5">
+            <a:extLst>
+              <a:ext uri="{FF2B5EF4-FFF2-40B4-BE49-F238E27FC236}">
+                <a16:creationId xmlns:a16="http://schemas.microsoft.com/office/drawing/2014/main" xmlns="" id="{30B53655-EEE8-4D41-90F7-8A06BD494BF8}"/>
+              </a:ext>
+            </a:extLst>
+          </p:cNvPr>
+          <p:cNvPicPr>
+            <a:picLocks noChangeAspect="1"/>
+          </p:cNvPicPr>
+          <p:nvPr/>
+        </p:nvPicPr>
+        <p:blipFill>
+          <a:blip r:embed="rId3"/>
+          <a:stretch>
+            <a:fillRect/>
+          </a:stretch>
+        </p:blipFill>
+        <p:spPr>
+          <a:xfrm>
+            <a:off x="256511" y="5417560"/>
+            <a:ext cx="2223628" cy="560025"/>
+          </a:xfrm>
+          <a:prstGeom prst="rect">
+            <a:avLst/>
+          </a:prstGeom>
+        </p:spPr>
+      </p:pic>
     </p:spTree>
     <p:extLst>
       <p:ext uri="{BB962C8B-B14F-4D97-AF65-F5344CB8AC3E}">
-        <p14:creationId xmlns:p14="http://schemas.microsoft.com/office/powerpoint/2010/main" val="1056553415"/>
+        <p14:creationId xmlns:p14="http://schemas.microsoft.com/office/powerpoint/2010/main" val="1752679914"/>
       </p:ext>
     </p:extLst>
   </p:cSld>
@@ -4809,10 +4950,9 @@
           <a:lstStyle/>
           <a:p>
             <a:r>
-              <a:rPr lang="en-US" dirty="0" smtClean="0"/>
-              <a:t>Coming Soon</a:t>
-            </a:r>
-            <a:endParaRPr lang="en-US" dirty="0"/>
+              <a:rPr lang="en-US" dirty="0"/>
+              <a:t>About Us</a:t>
+            </a:r>
           </a:p>
         </p:txBody>
       </p:sp>
@@ -4826,33 +4966,108 @@
             <p:ph idx="1"/>
           </p:nvPr>
         </p:nvSpPr>
+        <p:spPr>
+          <a:xfrm>
+            <a:off x="4977025" y="1737361"/>
+            <a:ext cx="3712744" cy="4324247"/>
+          </a:xfrm>
+        </p:spPr>
+        <p:txBody>
+          <a:bodyPr>
+            <a:normAutofit/>
+          </a:bodyPr>
+          <a:lstStyle/>
+          <a:p>
+            <a:r>
+              <a:rPr lang="en-US" sz="1600" dirty="0" smtClean="0"/>
+              <a:t>Not the Droids You Are Looking for is a 7</a:t>
+            </a:r>
+            <a:r>
+              <a:rPr lang="en-US" sz="1600" baseline="30000" dirty="0" smtClean="0"/>
+              <a:t>th</a:t>
+            </a:r>
+            <a:r>
+              <a:rPr lang="en-US" sz="1600" dirty="0" smtClean="0"/>
+              <a:t> year team from Pittsburgh, PA</a:t>
+            </a:r>
+            <a:endParaRPr lang="en-US" sz="1200" dirty="0"/>
+          </a:p>
+          <a:p>
+            <a:r>
+              <a:rPr lang="en-US" sz="1600" dirty="0"/>
+              <a:t>They were Global Innovation Award </a:t>
+            </a:r>
+            <a:r>
+              <a:rPr lang="en-US" sz="1600" dirty="0"/>
+              <a:t>Semi-Finalists for their Trash-Trek </a:t>
+            </a:r>
+            <a:r>
+              <a:rPr lang="en-US" sz="1600" dirty="0" smtClean="0"/>
+              <a:t>Project, </a:t>
+            </a:r>
+            <a:r>
+              <a:rPr lang="en-US" sz="1600" dirty="0" err="1" smtClean="0"/>
+              <a:t>Invisi</a:t>
+            </a:r>
+            <a:r>
+              <a:rPr lang="en-US" sz="1600" dirty="0" smtClean="0"/>
+              <a:t>-Sort, in 2016.</a:t>
+            </a:r>
+            <a:endParaRPr lang="en-US" sz="1600" dirty="0"/>
+          </a:p>
+          <a:p>
+            <a:r>
+              <a:rPr lang="en-US" sz="1600" dirty="0"/>
+              <a:t>EV3Lessons.com was </a:t>
+            </a:r>
+            <a:r>
+              <a:rPr lang="en-US" sz="1600" dirty="0" smtClean="0"/>
+              <a:t>their award-winning </a:t>
+            </a:r>
+            <a:r>
+              <a:rPr lang="en-US" sz="1600" dirty="0"/>
+              <a:t>World Class </a:t>
+            </a:r>
+            <a:r>
+              <a:rPr lang="en-US" sz="1600" dirty="0" smtClean="0"/>
+              <a:t>project</a:t>
+            </a:r>
+            <a:r>
+              <a:rPr lang="en-US" sz="1600" dirty="0"/>
+              <a:t> </a:t>
+            </a:r>
+            <a:r>
+              <a:rPr lang="en-US" sz="1600" dirty="0" smtClean="0"/>
+              <a:t>in 2014-15.</a:t>
+            </a:r>
+          </a:p>
+          <a:p>
+            <a:r>
+              <a:rPr lang="en-US" sz="1600" dirty="0" smtClean="0"/>
+              <a:t>They have also won First Place Innovative Solution at the International Open in Toronto in 2014.</a:t>
+            </a:r>
+            <a:endParaRPr lang="en-US" sz="1600" dirty="0"/>
+          </a:p>
+        </p:txBody>
+      </p:sp>
+      <p:sp>
+        <p:nvSpPr>
+          <p:cNvPr id="4" name="Footer Placeholder 3"/>
+          <p:cNvSpPr>
+            <a:spLocks noGrp="1"/>
+          </p:cNvSpPr>
+          <p:nvPr>
+            <p:ph type="ftr" sz="quarter" idx="11"/>
+          </p:nvPr>
+        </p:nvSpPr>
         <p:spPr/>
         <p:txBody>
           <a:bodyPr/>
           <a:lstStyle/>
           <a:p>
-            <a:endParaRPr lang="en-US" dirty="0"/>
-          </a:p>
-        </p:txBody>
-      </p:sp>
-      <p:sp>
-        <p:nvSpPr>
-          <p:cNvPr id="4" name="Footer Placeholder 3"/>
-          <p:cNvSpPr>
-            <a:spLocks noGrp="1"/>
-          </p:cNvSpPr>
-          <p:nvPr>
-            <p:ph type="ftr" sz="quarter" idx="11"/>
-          </p:nvPr>
-        </p:nvSpPr>
-        <p:spPr/>
-        <p:txBody>
-          <a:bodyPr/>
-          <a:lstStyle/>
-          <a:p>
-            <a:r>
-              <a:rPr lang="en-US" smtClean="0"/>
-              <a:t>Copyright 2017, EV3Lessons.com (Last Edit 8/18/2017)</a:t>
+            <a:r>
+              <a:rPr lang="en-US" smtClean="0"/>
+              <a:t>Copyright 2017, EV3Lessons.com (Last Edit 9/27/2017)</a:t>
             </a:r>
             <a:endParaRPr lang="en-US" dirty="0"/>
           </a:p>
@@ -4881,10 +5096,225 @@
           </a:p>
         </p:txBody>
       </p:sp>
+      <p:sp>
+        <p:nvSpPr>
+          <p:cNvPr id="8" name="Rectangle 7"/>
+          <p:cNvSpPr/>
+          <p:nvPr/>
+        </p:nvSpPr>
+        <p:spPr>
+          <a:xfrm>
+            <a:off x="360464" y="1737361"/>
+            <a:ext cx="4572000" cy="2445798"/>
+          </a:xfrm>
+          <a:prstGeom prst="rect">
+            <a:avLst/>
+          </a:prstGeom>
+        </p:spPr>
+        <p:txBody>
+          <a:bodyPr>
+            <a:spAutoFit/>
+          </a:bodyPr>
+          <a:lstStyle/>
+          <a:p>
+            <a:pPr marL="91440" indent="-91440" defTabSz="914400">
+              <a:lnSpc>
+                <a:spcPct val="90000"/>
+              </a:lnSpc>
+              <a:spcBef>
+                <a:spcPts val="1200"/>
+              </a:spcBef>
+              <a:spcAft>
+                <a:spcPts val="200"/>
+              </a:spcAft>
+              <a:buClr>
+                <a:schemeClr val="accent1"/>
+              </a:buClr>
+              <a:buSzPct val="100000"/>
+              <a:buFont typeface="Calibri" panose="020F0502020204030204" pitchFamily="34" charset="0"/>
+              <a:buChar char=" "/>
+            </a:pPr>
+            <a:r>
+              <a:rPr lang="en-US" sz="1600" dirty="0" smtClean="0">
+                <a:solidFill>
+                  <a:schemeClr val="tx1">
+                    <a:lumMod val="75000"/>
+                    <a:lumOff val="25000"/>
+                  </a:schemeClr>
+                </a:solidFill>
+              </a:rPr>
+              <a:t>NeXT Gen are a middle school team from Garrett County, Maryland with 13 years in FIRST LEGO League (including competing in International Tournaments).</a:t>
+            </a:r>
+          </a:p>
+          <a:p>
+            <a:pPr marL="91440" indent="-91440" defTabSz="914400">
+              <a:lnSpc>
+                <a:spcPct val="90000"/>
+              </a:lnSpc>
+              <a:spcBef>
+                <a:spcPts val="1200"/>
+              </a:spcBef>
+              <a:spcAft>
+                <a:spcPts val="200"/>
+              </a:spcAft>
+              <a:buClr>
+                <a:schemeClr val="accent1"/>
+              </a:buClr>
+              <a:buSzPct val="100000"/>
+              <a:buFont typeface="Calibri" panose="020F0502020204030204" pitchFamily="34" charset="0"/>
+              <a:buChar char=" "/>
+            </a:pPr>
+            <a:r>
+              <a:rPr lang="en-US" sz="1600" dirty="0" smtClean="0">
+                <a:solidFill>
+                  <a:schemeClr val="tx1">
+                    <a:lumMod val="75000"/>
+                    <a:lumOff val="25000"/>
+                  </a:schemeClr>
+                </a:solidFill>
+              </a:rPr>
+              <a:t>They have won first place in 2013 Global Innovation Award. They also won Top 20 GIA Semi-Finalist in 2017 for innovative solution, </a:t>
+            </a:r>
+            <a:r>
+              <a:rPr lang="en-US" sz="1600" dirty="0" err="1" smtClean="0">
+                <a:solidFill>
+                  <a:schemeClr val="tx1">
+                    <a:lumMod val="75000"/>
+                    <a:lumOff val="25000"/>
+                  </a:schemeClr>
+                </a:solidFill>
+              </a:rPr>
+              <a:t>BeeHaven</a:t>
+            </a:r>
+            <a:r>
+              <a:rPr lang="en-US" sz="1600" dirty="0" smtClean="0">
+                <a:solidFill>
+                  <a:schemeClr val="tx1">
+                    <a:lumMod val="75000"/>
+                    <a:lumOff val="25000"/>
+                  </a:schemeClr>
+                </a:solidFill>
+              </a:rPr>
+              <a:t>.</a:t>
+            </a:r>
+            <a:endParaRPr lang="en-US" sz="1600" dirty="0">
+              <a:solidFill>
+                <a:schemeClr val="tx1">
+                  <a:lumMod val="75000"/>
+                  <a:lumOff val="25000"/>
+                </a:schemeClr>
+              </a:solidFill>
+            </a:endParaRPr>
+          </a:p>
+          <a:p>
+            <a:pPr marL="91440" indent="-91440" defTabSz="914400">
+              <a:lnSpc>
+                <a:spcPct val="90000"/>
+              </a:lnSpc>
+              <a:spcBef>
+                <a:spcPts val="1200"/>
+              </a:spcBef>
+              <a:spcAft>
+                <a:spcPts val="200"/>
+              </a:spcAft>
+              <a:buClr>
+                <a:schemeClr val="accent1"/>
+              </a:buClr>
+              <a:buSzPct val="100000"/>
+              <a:buFont typeface="Calibri" panose="020F0502020204030204" pitchFamily="34" charset="0"/>
+              <a:buChar char=" "/>
+            </a:pPr>
+            <a:r>
+              <a:rPr lang="en-US" sz="1600" dirty="0" smtClean="0">
+                <a:solidFill>
+                  <a:schemeClr val="tx1">
+                    <a:lumMod val="75000"/>
+                    <a:lumOff val="25000"/>
+                  </a:schemeClr>
+                </a:solidFill>
+              </a:rPr>
+              <a:t>In addition, they won first Place Innovative Solution at Mountain State Invitational in 2017.</a:t>
+            </a:r>
+            <a:endParaRPr lang="en-US" sz="1600" dirty="0">
+              <a:solidFill>
+                <a:schemeClr val="tx1">
+                  <a:lumMod val="75000"/>
+                  <a:lumOff val="25000"/>
+                </a:schemeClr>
+              </a:solidFill>
+            </a:endParaRPr>
+          </a:p>
+        </p:txBody>
+      </p:sp>
+      <p:pic>
+        <p:nvPicPr>
+          <p:cNvPr id="9" name="Picture 8">
+            <a:extLst>
+              <a:ext uri="{FF2B5EF4-FFF2-40B4-BE49-F238E27FC236}">
+                <a16:creationId xmlns="" xmlns:a16="http://schemas.microsoft.com/office/drawing/2014/main" id="{ACD91645-228F-4215-BAD4-320E2B349257}"/>
+              </a:ext>
+            </a:extLst>
+          </p:cNvPr>
+          <p:cNvPicPr>
+            <a:picLocks noChangeAspect="1"/>
+          </p:cNvPicPr>
+          <p:nvPr/>
+        </p:nvPicPr>
+        <p:blipFill rotWithShape="1">
+          <a:blip r:embed="rId2" cstate="print">
+            <a:extLst>
+              <a:ext uri="{28A0092B-C50C-407E-A947-70E740481C1C}">
+                <a14:useLocalDpi xmlns:a14="http://schemas.microsoft.com/office/drawing/2010/main"/>
+              </a:ext>
+            </a:extLst>
+          </a:blip>
+          <a:srcRect/>
+          <a:stretch/>
+        </p:blipFill>
+        <p:spPr>
+          <a:xfrm>
+            <a:off x="360464" y="4582619"/>
+            <a:ext cx="4305567" cy="1600630"/>
+          </a:xfrm>
+          <a:prstGeom prst="rect">
+            <a:avLst/>
+          </a:prstGeom>
+        </p:spPr>
+      </p:pic>
+      <p:pic>
+        <p:nvPicPr>
+          <p:cNvPr id="6" name="Picture 5"/>
+          <p:cNvPicPr>
+            <a:picLocks noChangeAspect="1"/>
+          </p:cNvPicPr>
+          <p:nvPr/>
+        </p:nvPicPr>
+        <p:blipFill>
+          <a:blip r:embed="rId3" cstate="print">
+            <a:extLst>
+              <a:ext uri="{28A0092B-C50C-407E-A947-70E740481C1C}">
+                <a14:useLocalDpi xmlns:a14="http://schemas.microsoft.com/office/drawing/2010/main"/>
+              </a:ext>
+            </a:extLst>
+          </a:blip>
+          <a:stretch>
+            <a:fillRect/>
+          </a:stretch>
+        </p:blipFill>
+        <p:spPr>
+          <a:xfrm>
+            <a:off x="6971113" y="4428590"/>
+            <a:ext cx="1754659" cy="1754659"/>
+          </a:xfrm>
+          <a:prstGeom prst="rect">
+            <a:avLst/>
+          </a:prstGeom>
+        </p:spPr>
+      </p:pic>
     </p:spTree>
     <p:extLst>
       <p:ext uri="{BB962C8B-B14F-4D97-AF65-F5344CB8AC3E}">
-        <p14:creationId xmlns:p14="http://schemas.microsoft.com/office/powerpoint/2010/main" val="663123803"/>
+        <p14:creationId xmlns:p14="http://schemas.microsoft.com/office/powerpoint/2010/main" val="184902058"/>
       </p:ext>
     </p:extLst>
   </p:cSld>
@@ -4928,12 +5358,9 @@
           <a:p>
             <a:r>
               <a:rPr lang="en-US" dirty="0" smtClean="0"/>
-              <a:t>About </a:t>
-            </a:r>
-            <a:r>
-              <a:rPr lang="en-US" dirty="0"/>
-              <a:t>Us</a:t>
-            </a:r>
+              <a:t>Why Share?</a:t>
+            </a:r>
+            <a:endParaRPr lang="en-US" dirty="0"/>
           </a:p>
         </p:txBody>
       </p:sp>
@@ -4947,107 +5374,28 @@
             <p:ph idx="1"/>
           </p:nvPr>
         </p:nvSpPr>
-        <p:spPr>
-          <a:xfrm>
-            <a:off x="241738" y="1853552"/>
-            <a:ext cx="4331451" cy="4478554"/>
-          </a:xfrm>
-        </p:spPr>
-        <p:txBody>
-          <a:bodyPr>
-            <a:noAutofit/>
-          </a:bodyPr>
-          <a:lstStyle/>
-          <a:p>
-            <a:pPr>
-              <a:lnSpc>
-                <a:spcPct val="150000"/>
-              </a:lnSpc>
-              <a:buFont typeface="Wingdings" panose="05000000000000000000" pitchFamily="2" charset="2"/>
-              <a:buChar char="§"/>
-            </a:pPr>
-            <a:r>
-              <a:rPr lang="en-US" sz="1600" dirty="0" smtClean="0"/>
-              <a:t> Middle school team from Garrett County, Maryland</a:t>
-            </a:r>
-          </a:p>
-          <a:p>
-            <a:pPr>
-              <a:lnSpc>
-                <a:spcPct val="150000"/>
-              </a:lnSpc>
-              <a:buFont typeface="Wingdings" panose="05000000000000000000" pitchFamily="2" charset="2"/>
-              <a:buChar char="§"/>
-            </a:pPr>
-            <a:r>
-              <a:rPr lang="en-US" sz="1600" dirty="0" smtClean="0"/>
-              <a:t> 13 years in FIRST LEGO League (including competing in International Tournaments)</a:t>
-            </a:r>
-          </a:p>
-          <a:p>
-            <a:pPr>
-              <a:lnSpc>
-                <a:spcPct val="150000"/>
-              </a:lnSpc>
-              <a:buFont typeface="Wingdings" panose="05000000000000000000" pitchFamily="2" charset="2"/>
-              <a:buChar char="§"/>
-            </a:pPr>
-            <a:r>
-              <a:rPr lang="en-US" sz="1600" dirty="0"/>
-              <a:t> </a:t>
-            </a:r>
-            <a:r>
-              <a:rPr lang="en-US" sz="1600" dirty="0" smtClean="0"/>
-              <a:t>First place 2013 Global </a:t>
-            </a:r>
-            <a:r>
-              <a:rPr lang="en-US" sz="1600" dirty="0"/>
-              <a:t>Innovation </a:t>
-            </a:r>
-            <a:r>
-              <a:rPr lang="en-US" sz="1600" dirty="0" smtClean="0"/>
-              <a:t>Award for the </a:t>
-            </a:r>
-            <a:r>
-              <a:rPr lang="en-US" sz="1600" dirty="0"/>
-              <a:t>Gramma </a:t>
-            </a:r>
-            <a:r>
-              <a:rPr lang="en-US" sz="1600" dirty="0" err="1" smtClean="0"/>
-              <a:t>Jamma</a:t>
-            </a:r>
-            <a:endParaRPr lang="en-US" sz="1600" dirty="0"/>
-          </a:p>
-          <a:p>
-            <a:pPr>
-              <a:lnSpc>
-                <a:spcPct val="150000"/>
-              </a:lnSpc>
-              <a:buFont typeface="Wingdings" panose="05000000000000000000" pitchFamily="2" charset="2"/>
-              <a:buChar char="§"/>
-            </a:pPr>
-            <a:r>
-              <a:rPr lang="en-US" sz="1600" dirty="0" smtClean="0"/>
-              <a:t> Top 20 GIA Semi-Finalist in 2017 for innovative solution, </a:t>
-            </a:r>
-            <a:r>
-              <a:rPr lang="en-US" sz="1600" dirty="0" err="1" smtClean="0"/>
-              <a:t>BeeHaven</a:t>
-            </a:r>
-            <a:endParaRPr lang="en-US" sz="1600" dirty="0" smtClean="0"/>
-          </a:p>
-          <a:p>
-            <a:pPr>
-              <a:lnSpc>
-                <a:spcPct val="150000"/>
-              </a:lnSpc>
-              <a:buFont typeface="Wingdings" panose="05000000000000000000" pitchFamily="2" charset="2"/>
-              <a:buChar char="§"/>
-            </a:pPr>
-            <a:r>
-              <a:rPr lang="en-US" sz="1600" dirty="0" smtClean="0"/>
-              <a:t> First Place Innovative Solution at Mountain State Invitational in 2017</a:t>
-            </a:r>
+        <p:spPr/>
+        <p:txBody>
+          <a:bodyPr/>
+          <a:lstStyle/>
+          <a:p>
+            <a:r>
+              <a:rPr lang="en-US" dirty="0" smtClean="0"/>
+              <a:t>In FIRST LEGO League, sharing your project is a very important component.</a:t>
+            </a:r>
+          </a:p>
+          <a:p>
+            <a:r>
+              <a:rPr lang="en-US" dirty="0" smtClean="0"/>
+              <a:t>Sharing your project involves the presentation given to judges (which is covered in the lesson on Presentations), but also sharing with members of the public.</a:t>
+            </a:r>
+          </a:p>
+          <a:p>
+            <a:r>
+              <a:rPr lang="en-US" dirty="0" smtClean="0"/>
+              <a:t>Not only is it good practice for your team to share your project, but it is a key part of FIRST LEGO League</a:t>
+            </a:r>
+            <a:endParaRPr lang="en-US" dirty="0"/>
           </a:p>
         </p:txBody>
       </p:sp>
@@ -5068,7 +5416,7 @@
           <a:p>
             <a:r>
               <a:rPr lang="en-US" smtClean="0"/>
-              <a:t>Copyright 2017, EV3Lessons.com (Last Edit 8/24/2017)</a:t>
+              <a:t>Copyright 2017, EV3Lessons.com (Last Edit 10/31/2017)</a:t>
             </a:r>
             <a:endParaRPr lang="en-US" dirty="0"/>
           </a:p>
@@ -5097,62 +5445,10 @@
           </a:p>
         </p:txBody>
       </p:sp>
-      <p:pic>
-        <p:nvPicPr>
-          <p:cNvPr id="10" name="Picture 9">
-            <a:extLst>
-              <a:ext uri="{FF2B5EF4-FFF2-40B4-BE49-F238E27FC236}">
-                <a16:creationId xmlns="" xmlns:a16="http://schemas.microsoft.com/office/drawing/2014/main" id="{ACD91645-228F-4215-BAD4-320E2B349257}"/>
-              </a:ext>
-            </a:extLst>
-          </p:cNvPr>
-          <p:cNvPicPr>
-            <a:picLocks noChangeAspect="1"/>
-          </p:cNvPicPr>
-          <p:nvPr/>
-        </p:nvPicPr>
-        <p:blipFill rotWithShape="1">
-          <a:blip r:embed="rId2"/>
-          <a:srcRect l="10786" t="10395" r="4615" b="33732"/>
-          <a:stretch/>
-        </p:blipFill>
-        <p:spPr>
-          <a:xfrm>
-            <a:off x="4573190" y="4603515"/>
-            <a:ext cx="4305567" cy="1600630"/>
-          </a:xfrm>
-          <a:prstGeom prst="rect">
-            <a:avLst/>
-          </a:prstGeom>
-        </p:spPr>
-      </p:pic>
-      <p:pic>
-        <p:nvPicPr>
-          <p:cNvPr id="8" name="Picture 7"/>
-          <p:cNvPicPr>
-            <a:picLocks noChangeAspect="1"/>
-          </p:cNvPicPr>
-          <p:nvPr/>
-        </p:nvPicPr>
-        <p:blipFill rotWithShape="1">
-          <a:blip r:embed="rId3"/>
-          <a:srcRect t="14009" b="1537"/>
-          <a:stretch/>
-        </p:blipFill>
-        <p:spPr>
-          <a:xfrm>
-            <a:off x="4573189" y="1888508"/>
-            <a:ext cx="4347343" cy="2539455"/>
-          </a:xfrm>
-          <a:prstGeom prst="rect">
-            <a:avLst/>
-          </a:prstGeom>
-        </p:spPr>
-      </p:pic>
     </p:spTree>
     <p:extLst>
       <p:ext uri="{BB962C8B-B14F-4D97-AF65-F5344CB8AC3E}">
-        <p14:creationId xmlns:p14="http://schemas.microsoft.com/office/powerpoint/2010/main" val="1248436574"/>
+        <p14:creationId xmlns:p14="http://schemas.microsoft.com/office/powerpoint/2010/main" val="1121203800"/>
       </p:ext>
     </p:extLst>
   </p:cSld>
@@ -5195,9 +5491,10 @@
           <a:lstStyle/>
           <a:p>
             <a:r>
-              <a:rPr lang="en-US" dirty="0"/>
-              <a:t>Credits</a:t>
-            </a:r>
+              <a:rPr lang="en-US" dirty="0" smtClean="0"/>
+              <a:t>Who Should You Share With?</a:t>
+            </a:r>
+            <a:endParaRPr lang="en-US" dirty="0"/>
           </a:p>
         </p:txBody>
       </p:sp>
@@ -5214,69 +5511,33 @@
         <p:spPr>
           <a:xfrm>
             <a:off x="241739" y="1845734"/>
-            <a:ext cx="8681544" cy="4023360"/>
+            <a:ext cx="4553027" cy="4023360"/>
           </a:xfrm>
         </p:spPr>
         <p:txBody>
-          <a:bodyPr>
-            <a:normAutofit/>
-          </a:bodyPr>
-          <a:lstStyle/>
-          <a:p>
-            <a:r>
-              <a:rPr lang="en-US" dirty="0"/>
-              <a:t>This lesson was written by Team 3659 NeXT </a:t>
-            </a:r>
+          <a:bodyPr/>
+          <a:lstStyle/>
+          <a:p>
             <a:r>
               <a:rPr lang="en-US" dirty="0" smtClean="0"/>
-              <a:t>GEN, with some edits by EV3Lessons</a:t>
+              <a:t>Starting with friends and family is a good </a:t>
             </a:r>
           </a:p>
           <a:p>
             <a:r>
               <a:rPr lang="en-US" dirty="0" smtClean="0"/>
-              <a:t>You can </a:t>
-            </a:r>
-            <a:r>
-              <a:rPr lang="en-US" dirty="0"/>
-              <a:t>contact Team 3659 NeXT GEN through </a:t>
-            </a:r>
-            <a:r>
-              <a:rPr lang="en-US" dirty="0" smtClean="0"/>
-              <a:t>their Facebook page: </a:t>
-            </a:r>
-            <a:r>
-              <a:rPr lang="en-US" dirty="0"/>
-              <a:t>Garrett County </a:t>
-            </a:r>
-            <a:r>
-              <a:rPr lang="en-US" dirty="0" smtClean="0"/>
-              <a:t>FIRST LEGO </a:t>
-            </a:r>
-            <a:r>
-              <a:rPr lang="en-US" dirty="0"/>
-              <a:t>League Team 3659. </a:t>
-            </a:r>
-            <a:endParaRPr lang="en-US" dirty="0" smtClean="0"/>
-          </a:p>
-          <a:p>
-            <a:r>
-              <a:rPr lang="en-US" dirty="0" smtClean="0"/>
-              <a:t>More lessons available at www.ev3lesssons.com</a:t>
-            </a:r>
-            <a:endParaRPr lang="en-US" dirty="0"/>
-          </a:p>
-          <a:p>
-            <a:pPr marL="0" indent="0">
-              <a:buNone/>
-            </a:pPr>
-            <a:endParaRPr lang="en-US" dirty="0"/>
-          </a:p>
-          <a:p>
-            <a:endParaRPr lang="en-US" dirty="0"/>
-          </a:p>
-          <a:p>
-            <a:endParaRPr lang="en-US" dirty="0"/>
+              <a:t>Sharing with school teachers and classmates is also great</a:t>
+            </a:r>
+          </a:p>
+          <a:p>
+            <a:r>
+              <a:rPr lang="en-US" sz="2400" i="1" dirty="0" smtClean="0">
+                <a:solidFill>
+                  <a:srgbClr val="FF0000"/>
+                </a:solidFill>
+              </a:rPr>
+              <a:t>But also make sure to share with people who would actually use your innovative solution</a:t>
+            </a:r>
           </a:p>
         </p:txBody>
       </p:sp>
@@ -5297,7 +5558,7 @@
           <a:p>
             <a:r>
               <a:rPr lang="en-US" smtClean="0"/>
-              <a:t>Copyright 2017, EV3Lessons.com (Last Edit 8/24/2017)</a:t>
+              <a:t>Copyright 2017, EV3Lessons.com (Last Edit 10/31/2017)</a:t>
             </a:r>
             <a:endParaRPr lang="en-US" dirty="0"/>
           </a:p>
@@ -5335,20 +5596,1050 @@
           <p:nvPr/>
         </p:nvPicPr>
         <p:blipFill rotWithShape="1">
-          <a:blip r:embed="rId2">
+          <a:blip r:embed="rId2" cstate="print">
             <a:extLst>
               <a:ext uri="{28A0092B-C50C-407E-A947-70E740481C1C}">
-                <a14:useLocalDpi xmlns:a14="http://schemas.microsoft.com/office/drawing/2010/main" val="0"/>
+                <a14:useLocalDpi xmlns:a14="http://schemas.microsoft.com/office/drawing/2010/main"/>
               </a:ext>
             </a:extLst>
           </a:blip>
-          <a:srcRect l="9379" t="11606" r="9183" b="11463"/>
+          <a:srcRect/>
           <a:stretch/>
         </p:blipFill>
         <p:spPr>
           <a:xfrm>
-            <a:off x="241739" y="3890368"/>
-            <a:ext cx="8620008" cy="2087099"/>
+            <a:off x="4980117" y="1969707"/>
+            <a:ext cx="3830250" cy="2960181"/>
+          </a:xfrm>
+          <a:prstGeom prst="rect">
+            <a:avLst/>
+          </a:prstGeom>
+        </p:spPr>
+      </p:pic>
+      <p:sp>
+        <p:nvSpPr>
+          <p:cNvPr id="8" name="TextBox 7"/>
+          <p:cNvSpPr txBox="1"/>
+          <p:nvPr/>
+        </p:nvSpPr>
+        <p:spPr>
+          <a:xfrm>
+            <a:off x="123568" y="5869094"/>
+            <a:ext cx="7105135" cy="369332"/>
+          </a:xfrm>
+          <a:prstGeom prst="rect">
+            <a:avLst/>
+          </a:prstGeom>
+          <a:noFill/>
+        </p:spPr>
+        <p:txBody>
+          <a:bodyPr wrap="square" rtlCol="0">
+            <a:spAutoFit/>
+          </a:bodyPr>
+          <a:lstStyle/>
+          <a:p>
+            <a:r>
+              <a:rPr lang="en-US" dirty="0" smtClean="0"/>
+              <a:t>Shared by: Not </a:t>
+            </a:r>
+            <a:r>
+              <a:rPr lang="en-US" smtClean="0"/>
+              <a:t>the Droids You Are Looking For</a:t>
+            </a:r>
+            <a:endParaRPr lang="en-US"/>
+          </a:p>
+        </p:txBody>
+      </p:sp>
+    </p:spTree>
+    <p:extLst>
+      <p:ext uri="{BB962C8B-B14F-4D97-AF65-F5344CB8AC3E}">
+        <p14:creationId xmlns:p14="http://schemas.microsoft.com/office/powerpoint/2010/main" val="502218039"/>
+      </p:ext>
+    </p:extLst>
+  </p:cSld>
+  <p:clrMapOvr>
+    <a:masterClrMapping/>
+  </p:clrMapOvr>
+</p:sld>
+</file>
+
+<file path=ppt/slides/slide5.xml><?xml version="1.0" encoding="utf-8"?>
+<p:sld xmlns:a="http://schemas.openxmlformats.org/drawingml/2006/main" xmlns:r="http://schemas.openxmlformats.org/officeDocument/2006/relationships" xmlns:p="http://schemas.openxmlformats.org/presentationml/2006/main">
+  <p:cSld>
+    <p:spTree>
+      <p:nvGrpSpPr>
+        <p:cNvPr id="1" name=""/>
+        <p:cNvGrpSpPr/>
+        <p:nvPr/>
+      </p:nvGrpSpPr>
+      <p:grpSpPr>
+        <a:xfrm>
+          <a:off x="0" y="0"/>
+          <a:ext cx="0" cy="0"/>
+          <a:chOff x="0" y="0"/>
+          <a:chExt cx="0" cy="0"/>
+        </a:xfrm>
+      </p:grpSpPr>
+      <p:sp>
+        <p:nvSpPr>
+          <p:cNvPr id="2" name="Title 1"/>
+          <p:cNvSpPr>
+            <a:spLocks noGrp="1"/>
+          </p:cNvSpPr>
+          <p:nvPr>
+            <p:ph type="title"/>
+          </p:nvPr>
+        </p:nvSpPr>
+        <p:spPr/>
+        <p:txBody>
+          <a:bodyPr/>
+          <a:lstStyle/>
+          <a:p>
+            <a:r>
+              <a:rPr lang="en-US" dirty="0" smtClean="0"/>
+              <a:t>Examples</a:t>
+            </a:r>
+            <a:endParaRPr lang="en-US" dirty="0"/>
+          </a:p>
+        </p:txBody>
+      </p:sp>
+      <p:sp>
+        <p:nvSpPr>
+          <p:cNvPr id="3" name="Content Placeholder 2"/>
+          <p:cNvSpPr>
+            <a:spLocks noGrp="1"/>
+          </p:cNvSpPr>
+          <p:nvPr>
+            <p:ph idx="1"/>
+          </p:nvPr>
+        </p:nvSpPr>
+        <p:spPr>
+          <a:xfrm>
+            <a:off x="241739" y="1845734"/>
+            <a:ext cx="4948099" cy="4023360"/>
+          </a:xfrm>
+        </p:spPr>
+        <p:txBody>
+          <a:bodyPr>
+            <a:normAutofit/>
+          </a:bodyPr>
+          <a:lstStyle/>
+          <a:p>
+            <a:r>
+              <a:rPr lang="en-US" b="1" dirty="0" smtClean="0"/>
+              <a:t>Project: </a:t>
+            </a:r>
+            <a:r>
+              <a:rPr lang="en-US" dirty="0" smtClean="0"/>
+              <a:t>Bats killed by turbines</a:t>
+            </a:r>
+          </a:p>
+          <a:p>
+            <a:r>
+              <a:rPr lang="en-US" b="1" dirty="0" smtClean="0"/>
+              <a:t>Shared with: </a:t>
+            </a:r>
+            <a:r>
+              <a:rPr lang="en-US" dirty="0" smtClean="0"/>
+              <a:t>Turbine operators</a:t>
+            </a:r>
+          </a:p>
+          <a:p>
+            <a:endParaRPr lang="en-US" dirty="0"/>
+          </a:p>
+          <a:p>
+            <a:r>
+              <a:rPr lang="en-US" b="1" dirty="0" smtClean="0"/>
+              <a:t>Project: </a:t>
+            </a:r>
+            <a:r>
+              <a:rPr lang="en-US" dirty="0" smtClean="0"/>
+              <a:t>Ash clouds causing engine damage</a:t>
+            </a:r>
+          </a:p>
+          <a:p>
+            <a:r>
+              <a:rPr lang="en-US" b="1" dirty="0" smtClean="0"/>
+              <a:t>Shared with:</a:t>
+            </a:r>
+            <a:r>
+              <a:rPr lang="en-US" dirty="0" smtClean="0"/>
+              <a:t> Airline operators</a:t>
+            </a:r>
+          </a:p>
+          <a:p>
+            <a:endParaRPr lang="en-US" dirty="0"/>
+          </a:p>
+          <a:p>
+            <a:r>
+              <a:rPr lang="en-US" b="1" dirty="0" smtClean="0"/>
+              <a:t>Project: </a:t>
+            </a:r>
+            <a:r>
+              <a:rPr lang="en-US" dirty="0" smtClean="0"/>
+              <a:t>Senior Citizens needing reminders</a:t>
+            </a:r>
+          </a:p>
+          <a:p>
+            <a:r>
+              <a:rPr lang="en-US" b="1" dirty="0" smtClean="0"/>
+              <a:t>Shared with: </a:t>
+            </a:r>
+            <a:r>
+              <a:rPr lang="en-US" dirty="0" smtClean="0"/>
+              <a:t>Your own grandparents as well those in nursing homes </a:t>
+            </a:r>
+            <a:endParaRPr lang="en-US" dirty="0"/>
+          </a:p>
+        </p:txBody>
+      </p:sp>
+      <p:sp>
+        <p:nvSpPr>
+          <p:cNvPr id="4" name="Footer Placeholder 3"/>
+          <p:cNvSpPr>
+            <a:spLocks noGrp="1"/>
+          </p:cNvSpPr>
+          <p:nvPr>
+            <p:ph type="ftr" sz="quarter" idx="11"/>
+          </p:nvPr>
+        </p:nvSpPr>
+        <p:spPr/>
+        <p:txBody>
+          <a:bodyPr/>
+          <a:lstStyle/>
+          <a:p>
+            <a:r>
+              <a:rPr lang="en-US" smtClean="0"/>
+              <a:t>Copyright 2017, EV3Lessons.com (Last Edit 10/31/2017)</a:t>
+            </a:r>
+            <a:endParaRPr lang="en-US" dirty="0"/>
+          </a:p>
+        </p:txBody>
+      </p:sp>
+      <p:sp>
+        <p:nvSpPr>
+          <p:cNvPr id="5" name="Slide Number Placeholder 4"/>
+          <p:cNvSpPr>
+            <a:spLocks noGrp="1"/>
+          </p:cNvSpPr>
+          <p:nvPr>
+            <p:ph type="sldNum" sz="quarter" idx="12"/>
+          </p:nvPr>
+        </p:nvSpPr>
+        <p:spPr/>
+        <p:txBody>
+          <a:bodyPr/>
+          <a:lstStyle/>
+          <a:p>
+            <a:fld id="{6D22F896-40B5-4ADD-8801-0D06FADFA095}" type="slidenum">
+              <a:rPr lang="en-US" smtClean="0"/>
+              <a:t>5</a:t>
+            </a:fld>
+            <a:endParaRPr lang="en-US" dirty="0"/>
+          </a:p>
+        </p:txBody>
+      </p:sp>
+      <p:pic>
+        <p:nvPicPr>
+          <p:cNvPr id="6" name="Picture 5"/>
+          <p:cNvPicPr>
+            <a:picLocks noChangeAspect="1"/>
+          </p:cNvPicPr>
+          <p:nvPr/>
+        </p:nvPicPr>
+        <p:blipFill>
+          <a:blip r:embed="rId2" cstate="print">
+            <a:extLst>
+              <a:ext uri="{28A0092B-C50C-407E-A947-70E740481C1C}">
+                <a14:useLocalDpi xmlns:a14="http://schemas.microsoft.com/office/drawing/2010/main"/>
+              </a:ext>
+            </a:extLst>
+          </a:blip>
+          <a:stretch>
+            <a:fillRect/>
+          </a:stretch>
+        </p:blipFill>
+        <p:spPr>
+          <a:xfrm>
+            <a:off x="5088971" y="2100650"/>
+            <a:ext cx="3622542" cy="2716906"/>
+          </a:xfrm>
+          <a:prstGeom prst="rect">
+            <a:avLst/>
+          </a:prstGeom>
+        </p:spPr>
+      </p:pic>
+      <p:sp>
+        <p:nvSpPr>
+          <p:cNvPr id="7" name="TextBox 6"/>
+          <p:cNvSpPr txBox="1"/>
+          <p:nvPr/>
+        </p:nvSpPr>
+        <p:spPr>
+          <a:xfrm>
+            <a:off x="123568" y="5869094"/>
+            <a:ext cx="7105135" cy="369332"/>
+          </a:xfrm>
+          <a:prstGeom prst="rect">
+            <a:avLst/>
+          </a:prstGeom>
+          <a:noFill/>
+        </p:spPr>
+        <p:txBody>
+          <a:bodyPr wrap="square" rtlCol="0">
+            <a:spAutoFit/>
+          </a:bodyPr>
+          <a:lstStyle/>
+          <a:p>
+            <a:r>
+              <a:rPr lang="en-US" dirty="0" smtClean="0"/>
+              <a:t>Shared by: Not the Droids You Are Looking For</a:t>
+            </a:r>
+            <a:endParaRPr lang="en-US" dirty="0"/>
+          </a:p>
+        </p:txBody>
+      </p:sp>
+    </p:spTree>
+    <p:extLst>
+      <p:ext uri="{BB962C8B-B14F-4D97-AF65-F5344CB8AC3E}">
+        <p14:creationId xmlns:p14="http://schemas.microsoft.com/office/powerpoint/2010/main" val="983389639"/>
+      </p:ext>
+    </p:extLst>
+  </p:cSld>
+  <p:clrMapOvr>
+    <a:masterClrMapping/>
+  </p:clrMapOvr>
+</p:sld>
+</file>
+
+<file path=ppt/slides/slide6.xml><?xml version="1.0" encoding="utf-8"?>
+<p:sld xmlns:a="http://schemas.openxmlformats.org/drawingml/2006/main" xmlns:r="http://schemas.openxmlformats.org/officeDocument/2006/relationships" xmlns:p="http://schemas.openxmlformats.org/presentationml/2006/main">
+  <p:cSld>
+    <p:spTree>
+      <p:nvGrpSpPr>
+        <p:cNvPr id="1" name=""/>
+        <p:cNvGrpSpPr/>
+        <p:nvPr/>
+      </p:nvGrpSpPr>
+      <p:grpSpPr>
+        <a:xfrm>
+          <a:off x="0" y="0"/>
+          <a:ext cx="0" cy="0"/>
+          <a:chOff x="0" y="0"/>
+          <a:chExt cx="0" cy="0"/>
+        </a:xfrm>
+      </p:grpSpPr>
+      <p:sp>
+        <p:nvSpPr>
+          <p:cNvPr id="2" name="Title 1">
+            <a:extLst>
+              <a:ext uri="{FF2B5EF4-FFF2-40B4-BE49-F238E27FC236}">
+                <a16:creationId xmlns:a16="http://schemas.microsoft.com/office/drawing/2014/main" xmlns="" id="{E8EE545E-5894-439F-9E5E-835922FC23DA}"/>
+              </a:ext>
+            </a:extLst>
+          </p:cNvPr>
+          <p:cNvSpPr>
+            <a:spLocks noGrp="1"/>
+          </p:cNvSpPr>
+          <p:nvPr>
+            <p:ph type="title"/>
+          </p:nvPr>
+        </p:nvSpPr>
+        <p:spPr/>
+        <p:txBody>
+          <a:bodyPr/>
+          <a:lstStyle/>
+          <a:p>
+            <a:r>
+              <a:rPr lang="en-US" dirty="0"/>
+              <a:t>How to Share Your Project</a:t>
+            </a:r>
+          </a:p>
+        </p:txBody>
+      </p:sp>
+      <p:sp>
+        <p:nvSpPr>
+          <p:cNvPr id="3" name="Content Placeholder 2">
+            <a:extLst>
+              <a:ext uri="{FF2B5EF4-FFF2-40B4-BE49-F238E27FC236}">
+                <a16:creationId xmlns:a16="http://schemas.microsoft.com/office/drawing/2014/main" xmlns="" id="{C6598827-06A2-4BE3-B5CC-3CB88F6804C5}"/>
+              </a:ext>
+            </a:extLst>
+          </p:cNvPr>
+          <p:cNvSpPr>
+            <a:spLocks noGrp="1"/>
+          </p:cNvSpPr>
+          <p:nvPr>
+            <p:ph idx="1"/>
+          </p:nvPr>
+        </p:nvSpPr>
+        <p:spPr>
+          <a:xfrm>
+            <a:off x="241739" y="1813075"/>
+            <a:ext cx="8681544" cy="4429105"/>
+          </a:xfrm>
+        </p:spPr>
+        <p:txBody>
+          <a:bodyPr>
+            <a:normAutofit/>
+          </a:bodyPr>
+          <a:lstStyle/>
+          <a:p>
+            <a:r>
+              <a:rPr lang="en-US" sz="1800" dirty="0"/>
+              <a:t>When the team is sharing their </a:t>
+            </a:r>
+            <a:r>
+              <a:rPr lang="en-US" sz="1800" dirty="0" smtClean="0"/>
+              <a:t>project</a:t>
+            </a:r>
+            <a:endParaRPr lang="en-US" sz="1800" dirty="0"/>
+          </a:p>
+          <a:p>
+            <a:pPr marL="544068" lvl="1" indent="-342900">
+              <a:buFont typeface="+mj-lt"/>
+              <a:buAutoNum type="arabicPeriod"/>
+            </a:pPr>
+            <a:r>
+              <a:rPr lang="en-US" dirty="0"/>
+              <a:t>Introduce the team enthusiastically </a:t>
+            </a:r>
+          </a:p>
+          <a:p>
+            <a:pPr marL="544068" lvl="1" indent="-342900">
+              <a:buFont typeface="+mj-lt"/>
+              <a:buAutoNum type="arabicPeriod"/>
+            </a:pPr>
+            <a:r>
+              <a:rPr lang="en-US" dirty="0"/>
+              <a:t>Explain FIRST LEGO League</a:t>
+            </a:r>
+          </a:p>
+          <a:p>
+            <a:pPr marL="544068" lvl="1" indent="-342900">
+              <a:buFont typeface="+mj-lt"/>
+              <a:buAutoNum type="arabicPeriod"/>
+            </a:pPr>
+            <a:r>
+              <a:rPr lang="en-US" dirty="0"/>
+              <a:t>Explain the theme of this season</a:t>
+            </a:r>
+          </a:p>
+          <a:p>
+            <a:pPr marL="544068" lvl="1" indent="-342900">
+              <a:buFont typeface="+mj-lt"/>
+              <a:buAutoNum type="arabicPeriod"/>
+            </a:pPr>
+            <a:r>
+              <a:rPr lang="en-US" dirty="0"/>
+              <a:t>Define the problem</a:t>
+            </a:r>
+          </a:p>
+          <a:p>
+            <a:pPr marL="544068" lvl="1" indent="-342900">
+              <a:buFont typeface="+mj-lt"/>
+              <a:buAutoNum type="arabicPeriod"/>
+            </a:pPr>
+            <a:r>
+              <a:rPr lang="en-US" dirty="0"/>
+              <a:t>Explain existing solutions</a:t>
+            </a:r>
+          </a:p>
+          <a:p>
+            <a:pPr marL="544068" lvl="1" indent="-342900">
+              <a:buFont typeface="+mj-lt"/>
+              <a:buAutoNum type="arabicPeriod"/>
+            </a:pPr>
+            <a:r>
+              <a:rPr lang="en-US" dirty="0"/>
+              <a:t>Explain the solution</a:t>
+            </a:r>
+          </a:p>
+          <a:p>
+            <a:pPr marL="544068" lvl="1" indent="-342900">
+              <a:buFont typeface="+mj-lt"/>
+              <a:buAutoNum type="arabicPeriod"/>
+            </a:pPr>
+            <a:r>
+              <a:rPr lang="en-US" dirty="0"/>
+              <a:t>Explain why the solution is innovative</a:t>
+            </a:r>
+          </a:p>
+          <a:p>
+            <a:pPr marL="544068" lvl="1" indent="-342900">
+              <a:buFont typeface="+mj-lt"/>
+              <a:buAutoNum type="arabicPeriod"/>
+            </a:pPr>
+            <a:r>
+              <a:rPr lang="en-US" dirty="0"/>
+              <a:t>If the team tested the solution and made prototypes, explain the data that was received and talk about the prototype(s).</a:t>
+            </a:r>
+          </a:p>
+          <a:p>
+            <a:pPr marL="0" indent="0">
+              <a:lnSpc>
+                <a:spcPct val="100000"/>
+              </a:lnSpc>
+              <a:buNone/>
+            </a:pPr>
+            <a:r>
+              <a:rPr lang="en-US" sz="1600" b="1" dirty="0">
+                <a:solidFill>
+                  <a:srgbClr val="FF0000"/>
+                </a:solidFill>
+              </a:rPr>
+              <a:t>Tip: </a:t>
+            </a:r>
+            <a:r>
+              <a:rPr lang="en-US" sz="1600" dirty="0" smtClean="0">
+                <a:solidFill>
+                  <a:schemeClr val="tx1"/>
+                </a:solidFill>
+              </a:rPr>
+              <a:t>If your presentation for the judges is ready, use this opportunity to present </a:t>
+            </a:r>
+            <a:r>
+              <a:rPr lang="en-US" sz="1600" dirty="0" smtClean="0">
+                <a:solidFill>
+                  <a:schemeClr val="tx1"/>
+                </a:solidFill>
+              </a:rPr>
+              <a:t>it. </a:t>
+            </a:r>
+            <a:r>
+              <a:rPr lang="en-US" sz="1600" dirty="0" smtClean="0">
+                <a:solidFill>
+                  <a:schemeClr val="tx1"/>
+                </a:solidFill>
+              </a:rPr>
+              <a:t>This </a:t>
+            </a:r>
+            <a:r>
+              <a:rPr lang="en-US" sz="1600" dirty="0">
+                <a:solidFill>
+                  <a:schemeClr val="tx1"/>
+                </a:solidFill>
+              </a:rPr>
+              <a:t>gives the team practice and allows the team to see what can be improved.</a:t>
+            </a:r>
+          </a:p>
+        </p:txBody>
+      </p:sp>
+      <p:sp>
+        <p:nvSpPr>
+          <p:cNvPr id="4" name="Footer Placeholder 3">
+            <a:extLst>
+              <a:ext uri="{FF2B5EF4-FFF2-40B4-BE49-F238E27FC236}">
+                <a16:creationId xmlns:a16="http://schemas.microsoft.com/office/drawing/2014/main" xmlns="" id="{3BBA6880-D1F4-4DBD-82FF-B7546CFAE5AA}"/>
+              </a:ext>
+            </a:extLst>
+          </p:cNvPr>
+          <p:cNvSpPr>
+            <a:spLocks noGrp="1"/>
+          </p:cNvSpPr>
+          <p:nvPr>
+            <p:ph type="ftr" sz="quarter" idx="11"/>
+          </p:nvPr>
+        </p:nvSpPr>
+        <p:spPr/>
+        <p:txBody>
+          <a:bodyPr/>
+          <a:lstStyle/>
+          <a:p>
+            <a:r>
+              <a:rPr lang="en-US" smtClean="0"/>
+              <a:t>Copyright 2017, EV3Lessons.com (Last Edit 10/31/2017)</a:t>
+            </a:r>
+            <a:endParaRPr lang="en-US" dirty="0"/>
+          </a:p>
+        </p:txBody>
+      </p:sp>
+      <p:sp>
+        <p:nvSpPr>
+          <p:cNvPr id="5" name="Slide Number Placeholder 4">
+            <a:extLst>
+              <a:ext uri="{FF2B5EF4-FFF2-40B4-BE49-F238E27FC236}">
+                <a16:creationId xmlns:a16="http://schemas.microsoft.com/office/drawing/2014/main" xmlns="" id="{D705D914-52C9-43FA-929B-7492FBF79FD5}"/>
+              </a:ext>
+            </a:extLst>
+          </p:cNvPr>
+          <p:cNvSpPr>
+            <a:spLocks noGrp="1"/>
+          </p:cNvSpPr>
+          <p:nvPr>
+            <p:ph type="sldNum" sz="quarter" idx="12"/>
+          </p:nvPr>
+        </p:nvSpPr>
+        <p:spPr/>
+        <p:txBody>
+          <a:bodyPr/>
+          <a:lstStyle/>
+          <a:p>
+            <a:fld id="{6D22F896-40B5-4ADD-8801-0D06FADFA095}" type="slidenum">
+              <a:rPr lang="en-US" smtClean="0"/>
+              <a:t>6</a:t>
+            </a:fld>
+            <a:endParaRPr lang="en-US" dirty="0"/>
+          </a:p>
+        </p:txBody>
+      </p:sp>
+      <p:pic>
+        <p:nvPicPr>
+          <p:cNvPr id="9" name="Picture 8">
+            <a:extLst>
+              <a:ext uri="{FF2B5EF4-FFF2-40B4-BE49-F238E27FC236}">
+                <a16:creationId xmlns:a16="http://schemas.microsoft.com/office/drawing/2014/main" xmlns="" id="{1408B4BE-7799-4671-B6D9-0AC37FB89B04}"/>
+              </a:ext>
+            </a:extLst>
+          </p:cNvPr>
+          <p:cNvPicPr>
+            <a:picLocks noChangeAspect="1"/>
+          </p:cNvPicPr>
+          <p:nvPr/>
+        </p:nvPicPr>
+        <p:blipFill rotWithShape="1">
+          <a:blip r:embed="rId2" cstate="print">
+            <a:extLst>
+              <a:ext uri="{28A0092B-C50C-407E-A947-70E740481C1C}">
+                <a14:useLocalDpi xmlns:a14="http://schemas.microsoft.com/office/drawing/2010/main"/>
+              </a:ext>
+            </a:extLst>
+          </a:blip>
+          <a:srcRect/>
+          <a:stretch/>
+        </p:blipFill>
+        <p:spPr>
+          <a:xfrm>
+            <a:off x="4450702" y="2161319"/>
+            <a:ext cx="4180114" cy="2022203"/>
+          </a:xfrm>
+          <a:prstGeom prst="rect">
+            <a:avLst/>
+          </a:prstGeom>
+        </p:spPr>
+      </p:pic>
+      <p:sp>
+        <p:nvSpPr>
+          <p:cNvPr id="7" name="TextBox 6"/>
+          <p:cNvSpPr txBox="1"/>
+          <p:nvPr/>
+        </p:nvSpPr>
+        <p:spPr>
+          <a:xfrm>
+            <a:off x="135925" y="5869094"/>
+            <a:ext cx="7105135" cy="369332"/>
+          </a:xfrm>
+          <a:prstGeom prst="rect">
+            <a:avLst/>
+          </a:prstGeom>
+          <a:noFill/>
+        </p:spPr>
+        <p:txBody>
+          <a:bodyPr wrap="square" rtlCol="0">
+            <a:spAutoFit/>
+          </a:bodyPr>
+          <a:lstStyle/>
+          <a:p>
+            <a:r>
+              <a:rPr lang="en-US" dirty="0" smtClean="0"/>
+              <a:t>Shared by: NeXT GEN</a:t>
+            </a:r>
+            <a:endParaRPr lang="en-US" dirty="0"/>
+          </a:p>
+        </p:txBody>
+      </p:sp>
+    </p:spTree>
+    <p:extLst>
+      <p:ext uri="{BB962C8B-B14F-4D97-AF65-F5344CB8AC3E}">
+        <p14:creationId xmlns:p14="http://schemas.microsoft.com/office/powerpoint/2010/main" val="186781995"/>
+      </p:ext>
+    </p:extLst>
+  </p:cSld>
+  <p:clrMapOvr>
+    <a:masterClrMapping/>
+  </p:clrMapOvr>
+</p:sld>
+</file>
+
+<file path=ppt/slides/slide7.xml><?xml version="1.0" encoding="utf-8"?>
+<p:sld xmlns:a="http://schemas.openxmlformats.org/drawingml/2006/main" xmlns:r="http://schemas.openxmlformats.org/officeDocument/2006/relationships" xmlns:p="http://schemas.openxmlformats.org/presentationml/2006/main">
+  <p:cSld>
+    <p:spTree>
+      <p:nvGrpSpPr>
+        <p:cNvPr id="1" name=""/>
+        <p:cNvGrpSpPr/>
+        <p:nvPr/>
+      </p:nvGrpSpPr>
+      <p:grpSpPr>
+        <a:xfrm>
+          <a:off x="0" y="0"/>
+          <a:ext cx="0" cy="0"/>
+          <a:chOff x="0" y="0"/>
+          <a:chExt cx="0" cy="0"/>
+        </a:xfrm>
+      </p:grpSpPr>
+      <p:sp>
+        <p:nvSpPr>
+          <p:cNvPr id="2" name="Title 1"/>
+          <p:cNvSpPr>
+            <a:spLocks noGrp="1"/>
+          </p:cNvSpPr>
+          <p:nvPr>
+            <p:ph type="title"/>
+          </p:nvPr>
+        </p:nvSpPr>
+        <p:spPr/>
+        <p:txBody>
+          <a:bodyPr/>
+          <a:lstStyle/>
+          <a:p>
+            <a:r>
+              <a:rPr lang="en-US" dirty="0" smtClean="0"/>
+              <a:t>What Next?</a:t>
+            </a:r>
+            <a:endParaRPr lang="en-US" dirty="0"/>
+          </a:p>
+        </p:txBody>
+      </p:sp>
+      <p:sp>
+        <p:nvSpPr>
+          <p:cNvPr id="3" name="Content Placeholder 2"/>
+          <p:cNvSpPr>
+            <a:spLocks noGrp="1"/>
+          </p:cNvSpPr>
+          <p:nvPr>
+            <p:ph idx="1"/>
+          </p:nvPr>
+        </p:nvSpPr>
+        <p:spPr>
+          <a:xfrm>
+            <a:off x="241739" y="1845734"/>
+            <a:ext cx="4379688" cy="4023360"/>
+          </a:xfrm>
+        </p:spPr>
+        <p:txBody>
+          <a:bodyPr/>
+          <a:lstStyle/>
+          <a:p>
+            <a:r>
+              <a:rPr lang="en-US" dirty="0" smtClean="0"/>
+              <a:t>People you shared with might give you some useful feedback</a:t>
+            </a:r>
+          </a:p>
+          <a:p>
+            <a:r>
+              <a:rPr lang="en-US" dirty="0" smtClean="0"/>
+              <a:t>Try to incorporate the ideas into your innovative solution</a:t>
+            </a:r>
+          </a:p>
+          <a:p>
+            <a:r>
+              <a:rPr lang="en-US" dirty="0" smtClean="0"/>
+              <a:t>More than likely, the questions they asked you are also ones the judges may ask you. </a:t>
+            </a:r>
+          </a:p>
+          <a:p>
+            <a:r>
+              <a:rPr lang="en-US" dirty="0" smtClean="0"/>
+              <a:t>So, listen well and use </a:t>
+            </a:r>
+            <a:r>
+              <a:rPr lang="en-US" dirty="0"/>
+              <a:t>their feedback to also improve your presentation</a:t>
+            </a:r>
+          </a:p>
+          <a:p>
+            <a:endParaRPr lang="en-US" dirty="0"/>
+          </a:p>
+        </p:txBody>
+      </p:sp>
+      <p:sp>
+        <p:nvSpPr>
+          <p:cNvPr id="4" name="Footer Placeholder 3"/>
+          <p:cNvSpPr>
+            <a:spLocks noGrp="1"/>
+          </p:cNvSpPr>
+          <p:nvPr>
+            <p:ph type="ftr" sz="quarter" idx="11"/>
+          </p:nvPr>
+        </p:nvSpPr>
+        <p:spPr/>
+        <p:txBody>
+          <a:bodyPr/>
+          <a:lstStyle/>
+          <a:p>
+            <a:r>
+              <a:rPr lang="en-US" smtClean="0"/>
+              <a:t>Copyright 2017, EV3Lessons.com (Last Edit 10/31/2017)</a:t>
+            </a:r>
+            <a:endParaRPr lang="en-US" dirty="0"/>
+          </a:p>
+        </p:txBody>
+      </p:sp>
+      <p:sp>
+        <p:nvSpPr>
+          <p:cNvPr id="5" name="Slide Number Placeholder 4"/>
+          <p:cNvSpPr>
+            <a:spLocks noGrp="1"/>
+          </p:cNvSpPr>
+          <p:nvPr>
+            <p:ph type="sldNum" sz="quarter" idx="12"/>
+          </p:nvPr>
+        </p:nvSpPr>
+        <p:spPr/>
+        <p:txBody>
+          <a:bodyPr/>
+          <a:lstStyle/>
+          <a:p>
+            <a:fld id="{6D22F896-40B5-4ADD-8801-0D06FADFA095}" type="slidenum">
+              <a:rPr lang="en-US" smtClean="0"/>
+              <a:t>7</a:t>
+            </a:fld>
+            <a:endParaRPr lang="en-US" dirty="0"/>
+          </a:p>
+        </p:txBody>
+      </p:sp>
+      <p:pic>
+        <p:nvPicPr>
+          <p:cNvPr id="6" name="Picture 5"/>
+          <p:cNvPicPr>
+            <a:picLocks noChangeAspect="1"/>
+          </p:cNvPicPr>
+          <p:nvPr/>
+        </p:nvPicPr>
+        <p:blipFill>
+          <a:blip r:embed="rId3" cstate="print">
+            <a:extLst>
+              <a:ext uri="{28A0092B-C50C-407E-A947-70E740481C1C}">
+                <a14:useLocalDpi xmlns:a14="http://schemas.microsoft.com/office/drawing/2010/main"/>
+              </a:ext>
+            </a:extLst>
+          </a:blip>
+          <a:stretch>
+            <a:fillRect/>
+          </a:stretch>
+        </p:blipFill>
+        <p:spPr>
+          <a:xfrm>
+            <a:off x="4582510" y="2113407"/>
+            <a:ext cx="4064272" cy="2700689"/>
+          </a:xfrm>
+          <a:prstGeom prst="rect">
+            <a:avLst/>
+          </a:prstGeom>
+        </p:spPr>
+      </p:pic>
+      <p:sp>
+        <p:nvSpPr>
+          <p:cNvPr id="7" name="TextBox 6"/>
+          <p:cNvSpPr txBox="1"/>
+          <p:nvPr/>
+        </p:nvSpPr>
+        <p:spPr>
+          <a:xfrm>
+            <a:off x="123568" y="5869094"/>
+            <a:ext cx="8799714" cy="369332"/>
+          </a:xfrm>
+          <a:prstGeom prst="rect">
+            <a:avLst/>
+          </a:prstGeom>
+          <a:noFill/>
+        </p:spPr>
+        <p:txBody>
+          <a:bodyPr wrap="square" rtlCol="0">
+            <a:spAutoFit/>
+          </a:bodyPr>
+          <a:lstStyle/>
+          <a:p>
+            <a:r>
+              <a:rPr lang="en-US" dirty="0" smtClean="0"/>
+              <a:t>Shared by: </a:t>
+            </a:r>
+            <a:r>
+              <a:rPr lang="en-US" dirty="0"/>
+              <a:t>NeXT </a:t>
+            </a:r>
+            <a:r>
+              <a:rPr lang="en-US" dirty="0" smtClean="0"/>
+              <a:t>GEN and Not the Droids You Are Looking For</a:t>
+            </a:r>
+            <a:endParaRPr lang="en-US" dirty="0"/>
+          </a:p>
+        </p:txBody>
+      </p:sp>
+    </p:spTree>
+    <p:extLst>
+      <p:ext uri="{BB962C8B-B14F-4D97-AF65-F5344CB8AC3E}">
+        <p14:creationId xmlns:p14="http://schemas.microsoft.com/office/powerpoint/2010/main" val="1214745854"/>
+      </p:ext>
+    </p:extLst>
+  </p:cSld>
+  <p:clrMapOvr>
+    <a:masterClrMapping/>
+  </p:clrMapOvr>
+</p:sld>
+</file>
+
+<file path=ppt/slides/slide8.xml><?xml version="1.0" encoding="utf-8"?>
+<p:sld xmlns:a="http://schemas.openxmlformats.org/drawingml/2006/main" xmlns:r="http://schemas.openxmlformats.org/officeDocument/2006/relationships" xmlns:p="http://schemas.openxmlformats.org/presentationml/2006/main">
+  <p:cSld>
+    <p:spTree>
+      <p:nvGrpSpPr>
+        <p:cNvPr id="1" name=""/>
+        <p:cNvGrpSpPr/>
+        <p:nvPr/>
+      </p:nvGrpSpPr>
+      <p:grpSpPr>
+        <a:xfrm>
+          <a:off x="0" y="0"/>
+          <a:ext cx="0" cy="0"/>
+          <a:chOff x="0" y="0"/>
+          <a:chExt cx="0" cy="0"/>
+        </a:xfrm>
+      </p:grpSpPr>
+      <p:sp>
+        <p:nvSpPr>
+          <p:cNvPr id="2" name="Title 1"/>
+          <p:cNvSpPr>
+            <a:spLocks noGrp="1"/>
+          </p:cNvSpPr>
+          <p:nvPr>
+            <p:ph type="title"/>
+          </p:nvPr>
+        </p:nvSpPr>
+        <p:spPr/>
+        <p:txBody>
+          <a:bodyPr/>
+          <a:lstStyle/>
+          <a:p>
+            <a:r>
+              <a:rPr lang="en-US" dirty="0" smtClean="0"/>
+              <a:t>Credits</a:t>
+            </a:r>
+            <a:endParaRPr lang="en-US" dirty="0"/>
+          </a:p>
+        </p:txBody>
+      </p:sp>
+      <p:sp>
+        <p:nvSpPr>
+          <p:cNvPr id="3" name="Content Placeholder 2"/>
+          <p:cNvSpPr>
+            <a:spLocks noGrp="1"/>
+          </p:cNvSpPr>
+          <p:nvPr>
+            <p:ph idx="1"/>
+          </p:nvPr>
+        </p:nvSpPr>
+        <p:spPr/>
+        <p:txBody>
+          <a:bodyPr/>
+          <a:lstStyle/>
+          <a:p>
+            <a:r>
+              <a:rPr lang="en-US" dirty="0" smtClean="0"/>
+              <a:t>This lesson was written by </a:t>
+            </a:r>
+            <a:r>
+              <a:rPr lang="en-US" dirty="0" smtClean="0"/>
+              <a:t>Sanjay and Arvind from Not the Droids You Are </a:t>
+            </a:r>
+            <a:r>
+              <a:rPr lang="en-US" dirty="0"/>
+              <a:t>Looking For and Team 3659 NeXT GEN (</a:t>
+            </a:r>
+            <a:r>
+              <a:rPr lang="en-US" dirty="0" err="1"/>
+              <a:t>Facebook:Garrett</a:t>
+            </a:r>
+            <a:r>
+              <a:rPr lang="en-US" dirty="0"/>
+              <a:t> County FIRST LEGO League Team 3659). </a:t>
+            </a:r>
+            <a:endParaRPr lang="en-US" dirty="0" smtClean="0"/>
+          </a:p>
+          <a:p>
+            <a:r>
+              <a:rPr lang="en-US" dirty="0" smtClean="0"/>
+              <a:t>It has been shared with permission with EV3Lessons.com</a:t>
+            </a:r>
+          </a:p>
+          <a:p>
+            <a:endParaRPr lang="en-US" dirty="0"/>
+          </a:p>
+          <a:p>
+            <a:endParaRPr lang="en-US" dirty="0"/>
+          </a:p>
+        </p:txBody>
+      </p:sp>
+      <p:sp>
+        <p:nvSpPr>
+          <p:cNvPr id="4" name="Footer Placeholder 3"/>
+          <p:cNvSpPr>
+            <a:spLocks noGrp="1"/>
+          </p:cNvSpPr>
+          <p:nvPr>
+            <p:ph type="ftr" sz="quarter" idx="11"/>
+          </p:nvPr>
+        </p:nvSpPr>
+        <p:spPr/>
+        <p:txBody>
+          <a:bodyPr/>
+          <a:lstStyle/>
+          <a:p>
+            <a:r>
+              <a:rPr lang="en-US" smtClean="0"/>
+              <a:t>Copyright 2017, EV3Lessons.com (Last Edit 10/31/2017)</a:t>
+            </a:r>
+            <a:endParaRPr lang="en-US" dirty="0"/>
+          </a:p>
+        </p:txBody>
+      </p:sp>
+      <p:sp>
+        <p:nvSpPr>
+          <p:cNvPr id="5" name="Slide Number Placeholder 4"/>
+          <p:cNvSpPr>
+            <a:spLocks noGrp="1"/>
+          </p:cNvSpPr>
+          <p:nvPr>
+            <p:ph type="sldNum" sz="quarter" idx="12"/>
+          </p:nvPr>
+        </p:nvSpPr>
+        <p:spPr/>
+        <p:txBody>
+          <a:bodyPr/>
+          <a:lstStyle/>
+          <a:p>
+            <a:fld id="{6D22F896-40B5-4ADD-8801-0D06FADFA095}" type="slidenum">
+              <a:rPr lang="en-US" smtClean="0"/>
+              <a:t>8</a:t>
+            </a:fld>
+            <a:endParaRPr lang="en-US" dirty="0"/>
+          </a:p>
+        </p:txBody>
+      </p:sp>
+      <p:pic>
+        <p:nvPicPr>
+          <p:cNvPr id="6" name="Picture 5"/>
+          <p:cNvPicPr>
+            <a:picLocks noChangeAspect="1"/>
+          </p:cNvPicPr>
+          <p:nvPr/>
+        </p:nvPicPr>
+        <p:blipFill rotWithShape="1">
+          <a:blip r:embed="rId2" cstate="print">
+            <a:extLst>
+              <a:ext uri="{28A0092B-C50C-407E-A947-70E740481C1C}">
+                <a14:useLocalDpi xmlns:a14="http://schemas.microsoft.com/office/drawing/2010/main"/>
+              </a:ext>
+            </a:extLst>
+          </a:blip>
+          <a:srcRect/>
+          <a:stretch/>
+        </p:blipFill>
+        <p:spPr>
+          <a:xfrm>
+            <a:off x="847627" y="3458311"/>
+            <a:ext cx="7451126" cy="1804086"/>
           </a:xfrm>
           <a:prstGeom prst="rect">
             <a:avLst/>
@@ -5358,7 +6649,7 @@
     </p:spTree>
     <p:extLst>
       <p:ext uri="{BB962C8B-B14F-4D97-AF65-F5344CB8AC3E}">
-        <p14:creationId xmlns:p14="http://schemas.microsoft.com/office/powerpoint/2010/main" val="1558268028"/>
+        <p14:creationId xmlns:p14="http://schemas.microsoft.com/office/powerpoint/2010/main" val="478902130"/>
       </p:ext>
     </p:extLst>
   </p:cSld>

</xml_diff>